<commit_message>
linux: address the feedback for the video graphics test
Signed-off-by: Krunal Bhargav <k-bhargav@ti.com>
</commit_message>
<xml_diff>
--- a/source/images/video_graphics_test_image.pptx
+++ b/source/images/video_graphics_test_image.pptx
@@ -289,7 +289,7 @@
           <a:p>
             <a:fld id="{40FFB353-F912-4058-B383-2CAFC5AF1363}" type="datetimeFigureOut">
               <a:rPr lang="en-US" smtClean="0"/>
-              <a:t>1/24/2019</a:t>
+              <a:t>1/25/2019</a:t>
             </a:fld>
             <a:endParaRPr lang="en-US"/>
           </a:p>
@@ -459,7 +459,7 @@
           <a:p>
             <a:fld id="{40FFB353-F912-4058-B383-2CAFC5AF1363}" type="datetimeFigureOut">
               <a:rPr lang="en-US" smtClean="0"/>
-              <a:t>1/24/2019</a:t>
+              <a:t>1/25/2019</a:t>
             </a:fld>
             <a:endParaRPr lang="en-US"/>
           </a:p>
@@ -639,7 +639,7 @@
           <a:p>
             <a:fld id="{40FFB353-F912-4058-B383-2CAFC5AF1363}" type="datetimeFigureOut">
               <a:rPr lang="en-US" smtClean="0"/>
-              <a:t>1/24/2019</a:t>
+              <a:t>1/25/2019</a:t>
             </a:fld>
             <a:endParaRPr lang="en-US"/>
           </a:p>
@@ -809,7 +809,7 @@
           <a:p>
             <a:fld id="{40FFB353-F912-4058-B383-2CAFC5AF1363}" type="datetimeFigureOut">
               <a:rPr lang="en-US" smtClean="0"/>
-              <a:t>1/24/2019</a:t>
+              <a:t>1/25/2019</a:t>
             </a:fld>
             <a:endParaRPr lang="en-US"/>
           </a:p>
@@ -1055,7 +1055,7 @@
           <a:p>
             <a:fld id="{40FFB353-F912-4058-B383-2CAFC5AF1363}" type="datetimeFigureOut">
               <a:rPr lang="en-US" smtClean="0"/>
-              <a:t>1/24/2019</a:t>
+              <a:t>1/25/2019</a:t>
             </a:fld>
             <a:endParaRPr lang="en-US"/>
           </a:p>
@@ -1343,7 +1343,7 @@
           <a:p>
             <a:fld id="{40FFB353-F912-4058-B383-2CAFC5AF1363}" type="datetimeFigureOut">
               <a:rPr lang="en-US" smtClean="0"/>
-              <a:t>1/24/2019</a:t>
+              <a:t>1/25/2019</a:t>
             </a:fld>
             <a:endParaRPr lang="en-US"/>
           </a:p>
@@ -1765,7 +1765,7 @@
           <a:p>
             <a:fld id="{40FFB353-F912-4058-B383-2CAFC5AF1363}" type="datetimeFigureOut">
               <a:rPr lang="en-US" smtClean="0"/>
-              <a:t>1/24/2019</a:t>
+              <a:t>1/25/2019</a:t>
             </a:fld>
             <a:endParaRPr lang="en-US"/>
           </a:p>
@@ -1883,7 +1883,7 @@
           <a:p>
             <a:fld id="{40FFB353-F912-4058-B383-2CAFC5AF1363}" type="datetimeFigureOut">
               <a:rPr lang="en-US" smtClean="0"/>
-              <a:t>1/24/2019</a:t>
+              <a:t>1/25/2019</a:t>
             </a:fld>
             <a:endParaRPr lang="en-US"/>
           </a:p>
@@ -1978,7 +1978,7 @@
           <a:p>
             <a:fld id="{40FFB353-F912-4058-B383-2CAFC5AF1363}" type="datetimeFigureOut">
               <a:rPr lang="en-US" smtClean="0"/>
-              <a:t>1/24/2019</a:t>
+              <a:t>1/25/2019</a:t>
             </a:fld>
             <a:endParaRPr lang="en-US"/>
           </a:p>
@@ -2255,7 +2255,7 @@
           <a:p>
             <a:fld id="{40FFB353-F912-4058-B383-2CAFC5AF1363}" type="datetimeFigureOut">
               <a:rPr lang="en-US" smtClean="0"/>
-              <a:t>1/24/2019</a:t>
+              <a:t>1/25/2019</a:t>
             </a:fld>
             <a:endParaRPr lang="en-US"/>
           </a:p>
@@ -2508,7 +2508,7 @@
           <a:p>
             <a:fld id="{40FFB353-F912-4058-B383-2CAFC5AF1363}" type="datetimeFigureOut">
               <a:rPr lang="en-US" smtClean="0"/>
-              <a:t>1/24/2019</a:t>
+              <a:t>1/25/2019</a:t>
             </a:fld>
             <a:endParaRPr lang="en-US"/>
           </a:p>
@@ -2721,7 +2721,7 @@
           <a:p>
             <a:fld id="{40FFB353-F912-4058-B383-2CAFC5AF1363}" type="datetimeFigureOut">
               <a:rPr lang="en-US" smtClean="0"/>
-              <a:t>1/24/2019</a:t>
+              <a:t>1/25/2019</a:t>
             </a:fld>
             <a:endParaRPr lang="en-US"/>
           </a:p>
@@ -5768,11 +5768,7 @@
               <a:pPr algn="ctr"/>
               <a:r>
                 <a:rPr lang="en-US" sz="1400" dirty="0" smtClean="0"/>
-                <a:t>Export </a:t>
-              </a:r>
-              <a:r>
-                <a:rPr lang="en-US" sz="1400" dirty="0" smtClean="0"/>
-                <a:t>the physical buffers for display to DRM device</a:t>
+                <a:t>Export the physical buffers for display to DRM device</a:t>
               </a:r>
             </a:p>
             <a:p>
@@ -5829,15 +5825,7 @@
               <a:pPr algn="ctr"/>
               <a:r>
                 <a:rPr lang="en-US" sz="1400" dirty="0" smtClean="0"/>
-                <a:t>Set the DSS hardware </a:t>
-              </a:r>
-              <a:r>
-                <a:rPr lang="en-US" sz="1400" dirty="0" smtClean="0"/>
-                <a:t>plane </a:t>
-              </a:r>
-              <a:r>
-                <a:rPr lang="en-US" sz="1400" dirty="0" smtClean="0"/>
-                <a:t>properties</a:t>
+                <a:t>Set the DSS hardware plane properties</a:t>
               </a:r>
             </a:p>
             <a:p>
@@ -5894,11 +5882,7 @@
               <a:pPr algn="ctr"/>
               <a:r>
                 <a:rPr lang="en-US" sz="1400" dirty="0" smtClean="0"/>
-                <a:t>Queue the </a:t>
-              </a:r>
-              <a:r>
-                <a:rPr lang="en-US" sz="1400" dirty="0" smtClean="0"/>
-                <a:t>video buffers to display</a:t>
+                <a:t>Queue the video buffers to display</a:t>
               </a:r>
             </a:p>
             <a:p>
@@ -5955,11 +5939,7 @@
               <a:pPr algn="ctr"/>
               <a:r>
                 <a:rPr lang="en-US" sz="1400" dirty="0" smtClean="0"/>
-                <a:t>Begin display</a:t>
-              </a:r>
-              <a:r>
-                <a:rPr lang="en-US" sz="1400" dirty="0" smtClean="0"/>
-                <a:t> (</a:t>
+                <a:t>Begin display (</a:t>
               </a:r>
               <a:r>
                 <a:rPr lang="en-US" sz="1400" dirty="0" err="1" smtClean="0"/>
@@ -6246,7 +6226,15 @@
               <a:pPr algn="ctr"/>
               <a:r>
                 <a:rPr lang="en-US" sz="1400" dirty="0" smtClean="0"/>
-                <a:t>Free the video buffers for DRM device</a:t>
+                <a:t>Free the video buffers </a:t>
+              </a:r>
+              <a:r>
+                <a:rPr lang="en-US" sz="1400" dirty="0" smtClean="0"/>
+                <a:t>from DRM </a:t>
+              </a:r>
+              <a:r>
+                <a:rPr lang="en-US" sz="1400" dirty="0" smtClean="0"/>
+                <a:t>device</a:t>
               </a:r>
             </a:p>
             <a:p>
@@ -6320,7 +6308,6 @@
                 <a:rPr lang="en-US" sz="1400" dirty="0"/>
                 <a:t>)</a:t>
               </a:r>
-              <a:endParaRPr lang="en-US" sz="1400" dirty="0"/>
             </a:p>
           </p:txBody>
         </p:sp>

</xml_diff>